<commit_message>
BUGFIX: Title page font size became tiny when the user clicked in the title page -> solved
</commit_message>
<xml_diff>
--- a/inst/templates/Template.pptx
+++ b/inst/templates/Template.pptx
@@ -222,8 +222,8 @@
         </p:nvSpPr>
         <p:spPr>
           <a:xfrm>
-            <a:off x="250521" y="4714875"/>
-            <a:ext cx="11636679" cy="644842"/>
+            <a:off x="250521" y="4714874"/>
+            <a:ext cx="11636679" cy="1533525"/>
           </a:xfrm>
         </p:spPr>
         <p:txBody>
@@ -301,7 +301,7 @@
           <a:p>
             <a:fld id="{7B272C57-2FA0-4A9D-99A4-6F756B65018B}" type="datetimeFigureOut">
               <a:rPr lang="en-US" smtClean="0"/>
-              <a:t>11/8/2019</a:t>
+              <a:t>1/7/2022</a:t>
             </a:fld>
             <a:endParaRPr lang="en-US"/>
           </a:p>
@@ -458,7 +458,7 @@
           <a:p>
             <a:fld id="{7B272C57-2FA0-4A9D-99A4-6F756B65018B}" type="datetimeFigureOut">
               <a:rPr lang="en-US" smtClean="0"/>
-              <a:t>11/8/2019</a:t>
+              <a:t>1/7/2022</a:t>
             </a:fld>
             <a:endParaRPr lang="en-US"/>
           </a:p>
@@ -571,7 +571,7 @@
           <a:p>
             <a:fld id="{7B272C57-2FA0-4A9D-99A4-6F756B65018B}" type="datetimeFigureOut">
               <a:rPr lang="en-US" smtClean="0"/>
-              <a:t>11/8/2019</a:t>
+              <a:t>1/7/2022</a:t>
             </a:fld>
             <a:endParaRPr lang="en-US"/>
           </a:p>
@@ -882,7 +882,7 @@
           <a:p>
             <a:fld id="{7B272C57-2FA0-4A9D-99A4-6F756B65018B}" type="datetimeFigureOut">
               <a:rPr lang="en-US" smtClean="0"/>
-              <a:t>11/8/2019</a:t>
+              <a:t>1/7/2022</a:t>
             </a:fld>
             <a:endParaRPr lang="en-US"/>
           </a:p>
@@ -1170,7 +1170,7 @@
           <a:p>
             <a:fld id="{7B272C57-2FA0-4A9D-99A4-6F756B65018B}" type="datetimeFigureOut">
               <a:rPr lang="en-US" smtClean="0"/>
-              <a:t>11/8/2019</a:t>
+              <a:t>1/7/2022</a:t>
             </a:fld>
             <a:endParaRPr lang="en-US"/>
           </a:p>
@@ -1368,7 +1368,7 @@
           <a:p>
             <a:fld id="{7B272C57-2FA0-4A9D-99A4-6F756B65018B}" type="datetimeFigureOut">
               <a:rPr lang="en-US" smtClean="0"/>
-              <a:t>11/8/2019</a:t>
+              <a:t>1/7/2022</a:t>
             </a:fld>
             <a:endParaRPr lang="en-US"/>
           </a:p>
@@ -1576,7 +1576,7 @@
           <a:p>
             <a:fld id="{7B272C57-2FA0-4A9D-99A4-6F756B65018B}" type="datetimeFigureOut">
               <a:rPr lang="en-US" smtClean="0"/>
-              <a:t>11/8/2019</a:t>
+              <a:t>1/7/2022</a:t>
             </a:fld>
             <a:endParaRPr lang="en-US"/>
           </a:p>
@@ -1779,7 +1779,7 @@
           <a:p>
             <a:fld id="{7B272C57-2FA0-4A9D-99A4-6F756B65018B}" type="datetimeFigureOut">
               <a:rPr lang="en-US" smtClean="0"/>
-              <a:t>11/8/2019</a:t>
+              <a:t>1/7/2022</a:t>
             </a:fld>
             <a:endParaRPr lang="en-US"/>
           </a:p>
@@ -1987,7 +1987,7 @@
           <a:p>
             <a:fld id="{7B272C57-2FA0-4A9D-99A4-6F756B65018B}" type="datetimeFigureOut">
               <a:rPr lang="en-US" smtClean="0"/>
-              <a:t>11/8/2019</a:t>
+              <a:t>1/7/2022</a:t>
             </a:fld>
             <a:endParaRPr lang="en-US"/>
           </a:p>
@@ -2348,7 +2348,7 @@
           <a:p>
             <a:fld id="{7B272C57-2FA0-4A9D-99A4-6F756B65018B}" type="datetimeFigureOut">
               <a:rPr lang="en-US" smtClean="0"/>
-              <a:t>11/8/2019</a:t>
+              <a:t>1/7/2022</a:t>
             </a:fld>
             <a:endParaRPr lang="en-US"/>
           </a:p>
@@ -2469,7 +2469,7 @@
           <a:p>
             <a:fld id="{7B272C57-2FA0-4A9D-99A4-6F756B65018B}" type="datetimeFigureOut">
               <a:rPr lang="en-US" smtClean="0"/>
-              <a:t>11/8/2019</a:t>
+              <a:t>1/7/2022</a:t>
             </a:fld>
             <a:endParaRPr lang="en-US"/>
           </a:p>
@@ -2754,7 +2754,7 @@
           <a:p>
             <a:fld id="{7B272C57-2FA0-4A9D-99A4-6F756B65018B}" type="datetimeFigureOut">
               <a:rPr lang="en-US" smtClean="0"/>
-              <a:t>11/8/2019</a:t>
+              <a:t>1/7/2022</a:t>
             </a:fld>
             <a:endParaRPr lang="en-US"/>
           </a:p>
@@ -3128,7 +3128,7 @@
           <a:p>
             <a:fld id="{7B272C57-2FA0-4A9D-99A4-6F756B65018B}" type="datetimeFigureOut">
               <a:rPr lang="en-US" smtClean="0"/>
-              <a:t>11/8/2019</a:t>
+              <a:t>1/7/2022</a:t>
             </a:fld>
             <a:endParaRPr lang="en-US"/>
           </a:p>
@@ -3502,7 +3502,7 @@
           <a:p>
             <a:fld id="{7B272C57-2FA0-4A9D-99A4-6F756B65018B}" type="datetimeFigureOut">
               <a:rPr lang="en-US" smtClean="0"/>
-              <a:t>11/8/2019</a:t>
+              <a:t>1/7/2022</a:t>
             </a:fld>
             <a:endParaRPr lang="en-US"/>
           </a:p>
@@ -4258,7 +4258,7 @@
           <a:p>
             <a:fld id="{7B272C57-2FA0-4A9D-99A4-6F756B65018B}" type="datetimeFigureOut">
               <a:rPr lang="en-US" smtClean="0"/>
-              <a:t>11/8/2019</a:t>
+              <a:t>1/7/2022</a:t>
             </a:fld>
             <a:endParaRPr lang="en-US"/>
           </a:p>
@@ -4505,7 +4505,7 @@
           <a:p>
             <a:fld id="{7B272C57-2FA0-4A9D-99A4-6F756B65018B}" type="datetimeFigureOut">
               <a:rPr lang="en-US" smtClean="0"/>
-              <a:t>11/8/2019</a:t>
+              <a:t>1/7/2022</a:t>
             </a:fld>
             <a:endParaRPr lang="en-US"/>
           </a:p>

</xml_diff>